<commit_message>
Replaced Logspector with Kibana
</commit_message>
<xml_diff>
--- a/imgs/overview.pptx
+++ b/imgs/overview.pptx
@@ -261,7 +261,7 @@
           <a:p>
             <a:fld id="{4AF7FC59-CE6B-4373-8AD1-CA18C966BC3A}" type="datetimeFigureOut">
               <a:rPr lang="en-US" smtClean="0"/>
-              <a:t>3/18/2020</a:t>
+              <a:t>7/16/2020</a:t>
             </a:fld>
             <a:endParaRPr lang="en-US"/>
           </a:p>
@@ -461,7 +461,7 @@
           <a:p>
             <a:fld id="{4AF7FC59-CE6B-4373-8AD1-CA18C966BC3A}" type="datetimeFigureOut">
               <a:rPr lang="en-US" smtClean="0"/>
-              <a:t>3/18/2020</a:t>
+              <a:t>7/16/2020</a:t>
             </a:fld>
             <a:endParaRPr lang="en-US"/>
           </a:p>
@@ -671,7 +671,7 @@
           <a:p>
             <a:fld id="{4AF7FC59-CE6B-4373-8AD1-CA18C966BC3A}" type="datetimeFigureOut">
               <a:rPr lang="en-US" smtClean="0"/>
-              <a:t>3/18/2020</a:t>
+              <a:t>7/16/2020</a:t>
             </a:fld>
             <a:endParaRPr lang="en-US"/>
           </a:p>
@@ -871,7 +871,7 @@
           <a:p>
             <a:fld id="{4AF7FC59-CE6B-4373-8AD1-CA18C966BC3A}" type="datetimeFigureOut">
               <a:rPr lang="en-US" smtClean="0"/>
-              <a:t>3/18/2020</a:t>
+              <a:t>7/16/2020</a:t>
             </a:fld>
             <a:endParaRPr lang="en-US"/>
           </a:p>
@@ -1147,7 +1147,7 @@
           <a:p>
             <a:fld id="{4AF7FC59-CE6B-4373-8AD1-CA18C966BC3A}" type="datetimeFigureOut">
               <a:rPr lang="en-US" smtClean="0"/>
-              <a:t>3/18/2020</a:t>
+              <a:t>7/16/2020</a:t>
             </a:fld>
             <a:endParaRPr lang="en-US"/>
           </a:p>
@@ -1415,7 +1415,7 @@
           <a:p>
             <a:fld id="{4AF7FC59-CE6B-4373-8AD1-CA18C966BC3A}" type="datetimeFigureOut">
               <a:rPr lang="en-US" smtClean="0"/>
-              <a:t>3/18/2020</a:t>
+              <a:t>7/16/2020</a:t>
             </a:fld>
             <a:endParaRPr lang="en-US"/>
           </a:p>
@@ -1830,7 +1830,7 @@
           <a:p>
             <a:fld id="{4AF7FC59-CE6B-4373-8AD1-CA18C966BC3A}" type="datetimeFigureOut">
               <a:rPr lang="en-US" smtClean="0"/>
-              <a:t>3/18/2020</a:t>
+              <a:t>7/16/2020</a:t>
             </a:fld>
             <a:endParaRPr lang="en-US"/>
           </a:p>
@@ -1972,7 +1972,7 @@
           <a:p>
             <a:fld id="{4AF7FC59-CE6B-4373-8AD1-CA18C966BC3A}" type="datetimeFigureOut">
               <a:rPr lang="en-US" smtClean="0"/>
-              <a:t>3/18/2020</a:t>
+              <a:t>7/16/2020</a:t>
             </a:fld>
             <a:endParaRPr lang="en-US"/>
           </a:p>
@@ -2085,7 +2085,7 @@
           <a:p>
             <a:fld id="{4AF7FC59-CE6B-4373-8AD1-CA18C966BC3A}" type="datetimeFigureOut">
               <a:rPr lang="en-US" smtClean="0"/>
-              <a:t>3/18/2020</a:t>
+              <a:t>7/16/2020</a:t>
             </a:fld>
             <a:endParaRPr lang="en-US"/>
           </a:p>
@@ -2398,7 +2398,7 @@
           <a:p>
             <a:fld id="{4AF7FC59-CE6B-4373-8AD1-CA18C966BC3A}" type="datetimeFigureOut">
               <a:rPr lang="en-US" smtClean="0"/>
-              <a:t>3/18/2020</a:t>
+              <a:t>7/16/2020</a:t>
             </a:fld>
             <a:endParaRPr lang="en-US"/>
           </a:p>
@@ -2687,7 +2687,7 @@
           <a:p>
             <a:fld id="{4AF7FC59-CE6B-4373-8AD1-CA18C966BC3A}" type="datetimeFigureOut">
               <a:rPr lang="en-US" smtClean="0"/>
-              <a:t>3/18/2020</a:t>
+              <a:t>7/16/2020</a:t>
             </a:fld>
             <a:endParaRPr lang="en-US"/>
           </a:p>
@@ -2930,7 +2930,7 @@
           <a:p>
             <a:fld id="{4AF7FC59-CE6B-4373-8AD1-CA18C966BC3A}" type="datetimeFigureOut">
               <a:rPr lang="en-US" smtClean="0"/>
-              <a:t>3/18/2020</a:t>
+              <a:t>7/16/2020</a:t>
             </a:fld>
             <a:endParaRPr lang="en-US"/>
           </a:p>
@@ -6174,64 +6174,6 @@
           </a:fontRef>
         </p:style>
       </p:cxnSp>
-      <p:sp>
-        <p:nvSpPr>
-          <p:cNvPr id="66" name="Rechteck: abgerundete Ecken 65">
-            <a:extLst>
-              <a:ext uri="{FF2B5EF4-FFF2-40B4-BE49-F238E27FC236}">
-                <a16:creationId xmlns:a16="http://schemas.microsoft.com/office/drawing/2014/main" id="{48271FF7-E270-48AC-94C2-D5FD98AC3255}"/>
-              </a:ext>
-            </a:extLst>
-          </p:cNvPr>
-          <p:cNvSpPr/>
-          <p:nvPr/>
-        </p:nvSpPr>
-        <p:spPr>
-          <a:xfrm>
-            <a:off x="7634334" y="1812569"/>
-            <a:ext cx="1497931" cy="489193"/>
-          </a:xfrm>
-          <a:prstGeom prst="roundRect">
-            <a:avLst/>
-          </a:prstGeom>
-          <a:solidFill>
-            <a:srgbClr val="0070C0"/>
-          </a:solidFill>
-          <a:ln>
-            <a:solidFill>
-              <a:schemeClr val="tx1"/>
-            </a:solidFill>
-          </a:ln>
-        </p:spPr>
-        <p:style>
-          <a:lnRef idx="2">
-            <a:schemeClr val="accent1">
-              <a:shade val="50000"/>
-            </a:schemeClr>
-          </a:lnRef>
-          <a:fillRef idx="1">
-            <a:schemeClr val="accent1"/>
-          </a:fillRef>
-          <a:effectRef idx="0">
-            <a:schemeClr val="accent1"/>
-          </a:effectRef>
-          <a:fontRef idx="minor">
-            <a:schemeClr val="lt1"/>
-          </a:fontRef>
-        </p:style>
-        <p:txBody>
-          <a:bodyPr rtlCol="0" anchor="ctr"/>
-          <a:lstStyle/>
-          <a:p>
-            <a:pPr algn="ctr"/>
-            <a:r>
-              <a:rPr lang="de-DE" dirty="0" err="1"/>
-              <a:t>Logspector</a:t>
-            </a:r>
-            <a:endParaRPr lang="en-US" dirty="0"/>
-          </a:p>
-        </p:txBody>
-      </p:sp>
       <p:cxnSp>
         <p:nvCxnSpPr>
           <p:cNvPr id="67" name="Gerade Verbindung mit Pfeil 66">
@@ -6276,6 +6218,169 @@
           </a:fontRef>
         </p:style>
       </p:cxnSp>
+      <p:pic>
+        <p:nvPicPr>
+          <p:cNvPr id="68" name="Grafik 67" descr="Ein Bild, das Zeichnung enthält.&#10;&#10;Automatisch generierte Beschreibung">
+            <a:extLst>
+              <a:ext uri="{FF2B5EF4-FFF2-40B4-BE49-F238E27FC236}">
+                <a16:creationId xmlns:a16="http://schemas.microsoft.com/office/drawing/2014/main" id="{B8F70C6C-1A44-4C3B-A1B3-479D9057089D}"/>
+              </a:ext>
+            </a:extLst>
+          </p:cNvPr>
+          <p:cNvPicPr>
+            <a:picLocks noChangeAspect="1"/>
+          </p:cNvPicPr>
+          <p:nvPr/>
+        </p:nvPicPr>
+        <p:blipFill rotWithShape="1">
+          <a:blip r:embed="rId8">
+            <a:extLst>
+              <a:ext uri="{28A0092B-C50C-407E-A947-70E740481C1C}">
+                <a14:useLocalDpi xmlns:a14="http://schemas.microsoft.com/office/drawing/2010/main" val="0"/>
+              </a:ext>
+            </a:extLst>
+          </a:blip>
+          <a:srcRect r="71853"/>
+          <a:stretch/>
+        </p:blipFill>
+        <p:spPr>
+          <a:xfrm>
+            <a:off x="7730304" y="1954417"/>
+            <a:ext cx="266496" cy="318751"/>
+          </a:xfrm>
+          <a:prstGeom prst="rect">
+            <a:avLst/>
+          </a:prstGeom>
+        </p:spPr>
+      </p:pic>
+      <p:grpSp>
+        <p:nvGrpSpPr>
+          <p:cNvPr id="71" name="Gruppieren 70">
+            <a:extLst>
+              <a:ext uri="{FF2B5EF4-FFF2-40B4-BE49-F238E27FC236}">
+                <a16:creationId xmlns:a16="http://schemas.microsoft.com/office/drawing/2014/main" id="{ACE66FCF-33D6-492F-A260-096AB6D3F2D6}"/>
+              </a:ext>
+            </a:extLst>
+          </p:cNvPr>
+          <p:cNvGrpSpPr/>
+          <p:nvPr/>
+        </p:nvGrpSpPr>
+        <p:grpSpPr>
+          <a:xfrm>
+            <a:off x="7686447" y="1824075"/>
+            <a:ext cx="1384239" cy="489192"/>
+            <a:chOff x="6146861" y="2715547"/>
+            <a:chExt cx="1384239" cy="489192"/>
+          </a:xfrm>
+        </p:grpSpPr>
+        <p:pic>
+          <p:nvPicPr>
+            <p:cNvPr id="75" name="Grafik 74" descr="Ein Bild, das Schild, Uhr enthält.&#10;&#10;Automatisch generierte Beschreibung">
+              <a:extLst>
+                <a:ext uri="{FF2B5EF4-FFF2-40B4-BE49-F238E27FC236}">
+                  <a16:creationId xmlns:a16="http://schemas.microsoft.com/office/drawing/2014/main" id="{68EE47C9-41F5-42BF-AACF-EE89BE0384AA}"/>
+                </a:ext>
+              </a:extLst>
+            </p:cNvPr>
+            <p:cNvPicPr>
+              <a:picLocks noChangeAspect="1"/>
+            </p:cNvPicPr>
+            <p:nvPr/>
+          </p:nvPicPr>
+          <p:blipFill>
+            <a:blip r:embed="rId4">
+              <a:extLst>
+                <a:ext uri="{28A0092B-C50C-407E-A947-70E740481C1C}">
+                  <a14:useLocalDpi xmlns:a14="http://schemas.microsoft.com/office/drawing/2010/main" val="0"/>
+                </a:ext>
+              </a:extLst>
+            </a:blip>
+            <a:stretch>
+              <a:fillRect/>
+            </a:stretch>
+          </p:blipFill>
+          <p:spPr>
+            <a:xfrm>
+              <a:off x="7308791" y="3041495"/>
+              <a:ext cx="172375" cy="123617"/>
+            </a:xfrm>
+            <a:prstGeom prst="rect">
+              <a:avLst/>
+            </a:prstGeom>
+          </p:spPr>
+        </p:pic>
+        <p:sp>
+          <p:nvSpPr>
+            <p:cNvPr id="76" name="Rechteck: abgerundete Ecken 75">
+              <a:extLst>
+                <a:ext uri="{FF2B5EF4-FFF2-40B4-BE49-F238E27FC236}">
+                  <a16:creationId xmlns:a16="http://schemas.microsoft.com/office/drawing/2014/main" id="{C3DA5F65-72C6-4C4D-832F-1B8077F4634B}"/>
+                </a:ext>
+              </a:extLst>
+            </p:cNvPr>
+            <p:cNvSpPr/>
+            <p:nvPr/>
+          </p:nvSpPr>
+          <p:spPr>
+            <a:xfrm>
+              <a:off x="6146861" y="2715547"/>
+              <a:ext cx="1384239" cy="489192"/>
+            </a:xfrm>
+            <a:prstGeom prst="roundRect">
+              <a:avLst>
+                <a:gd name="adj" fmla="val 6712"/>
+              </a:avLst>
+            </a:prstGeom>
+            <a:noFill/>
+            <a:ln>
+              <a:solidFill>
+                <a:schemeClr val="tx1"/>
+              </a:solidFill>
+            </a:ln>
+          </p:spPr>
+          <p:style>
+            <a:lnRef idx="2">
+              <a:schemeClr val="accent1">
+                <a:shade val="50000"/>
+              </a:schemeClr>
+            </a:lnRef>
+            <a:fillRef idx="1">
+              <a:schemeClr val="accent1"/>
+            </a:fillRef>
+            <a:effectRef idx="0">
+              <a:schemeClr val="accent1"/>
+            </a:effectRef>
+            <a:fontRef idx="minor">
+              <a:schemeClr val="lt1"/>
+            </a:fontRef>
+          </p:style>
+          <p:txBody>
+            <a:bodyPr rot="0" spcFirstLastPara="0" vertOverflow="overflow" horzOverflow="overflow" vert="horz" wrap="square" lIns="91440" tIns="45720" rIns="91440" bIns="45720" numCol="1" spcCol="0" rtlCol="0" fromWordArt="0" anchor="t" anchorCtr="0" forceAA="0" compatLnSpc="1">
+              <a:prstTxWarp prst="textNoShape">
+                <a:avLst/>
+              </a:prstTxWarp>
+              <a:noAutofit/>
+            </a:bodyPr>
+            <a:lstStyle/>
+            <a:p>
+              <a:pPr algn="r"/>
+              <a:r>
+                <a:rPr lang="de-DE" sz="1400" dirty="0" err="1">
+                  <a:solidFill>
+                    <a:schemeClr val="tx1"/>
+                  </a:solidFill>
+                </a:rPr>
+                <a:t>Kibana</a:t>
+              </a:r>
+              <a:endParaRPr lang="en-US" sz="1400" dirty="0">
+                <a:solidFill>
+                  <a:schemeClr val="tx1"/>
+                </a:solidFill>
+              </a:endParaRPr>
+            </a:p>
+          </p:txBody>
+        </p:sp>
+      </p:grpSp>
     </p:spTree>
     <p:extLst>
       <p:ext uri="{BB962C8B-B14F-4D97-AF65-F5344CB8AC3E}">

</xml_diff>

<commit_message>
Added documentation for Long-Term-Analytics
</commit_message>
<xml_diff>
--- a/imgs/overview.pptx
+++ b/imgs/overview.pptx
@@ -7,6 +7,7 @@
   <p:sldIdLst>
     <p:sldId id="256" r:id="rId2"/>
     <p:sldId id="257" r:id="rId3"/>
+    <p:sldId id="258" r:id="rId4"/>
   </p:sldIdLst>
   <p:sldSz cx="12192000" cy="6858000"/>
   <p:notesSz cx="6858000" cy="9144000"/>
@@ -262,7 +263,7 @@
           <a:p>
             <a:fld id="{4AF7FC59-CE6B-4373-8AD1-CA18C966BC3A}" type="datetimeFigureOut">
               <a:rPr lang="en-US" smtClean="0"/>
-              <a:t>5/4/2021</a:t>
+              <a:t>8/31/2021</a:t>
             </a:fld>
             <a:endParaRPr lang="en-US"/>
           </a:p>
@@ -462,7 +463,7 @@
           <a:p>
             <a:fld id="{4AF7FC59-CE6B-4373-8AD1-CA18C966BC3A}" type="datetimeFigureOut">
               <a:rPr lang="en-US" smtClean="0"/>
-              <a:t>5/4/2021</a:t>
+              <a:t>8/31/2021</a:t>
             </a:fld>
             <a:endParaRPr lang="en-US"/>
           </a:p>
@@ -672,7 +673,7 @@
           <a:p>
             <a:fld id="{4AF7FC59-CE6B-4373-8AD1-CA18C966BC3A}" type="datetimeFigureOut">
               <a:rPr lang="en-US" smtClean="0"/>
-              <a:t>5/4/2021</a:t>
+              <a:t>8/31/2021</a:t>
             </a:fld>
             <a:endParaRPr lang="en-US"/>
           </a:p>
@@ -872,7 +873,7 @@
           <a:p>
             <a:fld id="{4AF7FC59-CE6B-4373-8AD1-CA18C966BC3A}" type="datetimeFigureOut">
               <a:rPr lang="en-US" smtClean="0"/>
-              <a:t>5/4/2021</a:t>
+              <a:t>8/31/2021</a:t>
             </a:fld>
             <a:endParaRPr lang="en-US"/>
           </a:p>
@@ -1148,7 +1149,7 @@
           <a:p>
             <a:fld id="{4AF7FC59-CE6B-4373-8AD1-CA18C966BC3A}" type="datetimeFigureOut">
               <a:rPr lang="en-US" smtClean="0"/>
-              <a:t>5/4/2021</a:t>
+              <a:t>8/31/2021</a:t>
             </a:fld>
             <a:endParaRPr lang="en-US"/>
           </a:p>
@@ -1416,7 +1417,7 @@
           <a:p>
             <a:fld id="{4AF7FC59-CE6B-4373-8AD1-CA18C966BC3A}" type="datetimeFigureOut">
               <a:rPr lang="en-US" smtClean="0"/>
-              <a:t>5/4/2021</a:t>
+              <a:t>8/31/2021</a:t>
             </a:fld>
             <a:endParaRPr lang="en-US"/>
           </a:p>
@@ -1831,7 +1832,7 @@
           <a:p>
             <a:fld id="{4AF7FC59-CE6B-4373-8AD1-CA18C966BC3A}" type="datetimeFigureOut">
               <a:rPr lang="en-US" smtClean="0"/>
-              <a:t>5/4/2021</a:t>
+              <a:t>8/31/2021</a:t>
             </a:fld>
             <a:endParaRPr lang="en-US"/>
           </a:p>
@@ -1973,7 +1974,7 @@
           <a:p>
             <a:fld id="{4AF7FC59-CE6B-4373-8AD1-CA18C966BC3A}" type="datetimeFigureOut">
               <a:rPr lang="en-US" smtClean="0"/>
-              <a:t>5/4/2021</a:t>
+              <a:t>8/31/2021</a:t>
             </a:fld>
             <a:endParaRPr lang="en-US"/>
           </a:p>
@@ -2086,7 +2087,7 @@
           <a:p>
             <a:fld id="{4AF7FC59-CE6B-4373-8AD1-CA18C966BC3A}" type="datetimeFigureOut">
               <a:rPr lang="en-US" smtClean="0"/>
-              <a:t>5/4/2021</a:t>
+              <a:t>8/31/2021</a:t>
             </a:fld>
             <a:endParaRPr lang="en-US"/>
           </a:p>
@@ -2399,7 +2400,7 @@
           <a:p>
             <a:fld id="{4AF7FC59-CE6B-4373-8AD1-CA18C966BC3A}" type="datetimeFigureOut">
               <a:rPr lang="en-US" smtClean="0"/>
-              <a:t>5/4/2021</a:t>
+              <a:t>8/31/2021</a:t>
             </a:fld>
             <a:endParaRPr lang="en-US"/>
           </a:p>
@@ -2688,7 +2689,7 @@
           <a:p>
             <a:fld id="{4AF7FC59-CE6B-4373-8AD1-CA18C966BC3A}" type="datetimeFigureOut">
               <a:rPr lang="en-US" smtClean="0"/>
-              <a:t>5/4/2021</a:t>
+              <a:t>8/31/2021</a:t>
             </a:fld>
             <a:endParaRPr lang="en-US"/>
           </a:p>
@@ -2931,7 +2932,7 @@
           <a:p>
             <a:fld id="{4AF7FC59-CE6B-4373-8AD1-CA18C966BC3A}" type="datetimeFigureOut">
               <a:rPr lang="en-US" smtClean="0"/>
-              <a:t>5/4/2021</a:t>
+              <a:t>8/31/2021</a:t>
             </a:fld>
             <a:endParaRPr lang="en-US"/>
           </a:p>
@@ -8036,6 +8037,632 @@
 </p:sld>
 </file>
 
+<file path=ppt/slides/slide3.xml><?xml version="1.0" encoding="utf-8"?>
+<p:sld xmlns:a="http://schemas.openxmlformats.org/drawingml/2006/main" xmlns:r="http://schemas.openxmlformats.org/officeDocument/2006/relationships" xmlns:p="http://schemas.openxmlformats.org/presentationml/2006/main">
+  <p:cSld>
+    <p:spTree>
+      <p:nvGrpSpPr>
+        <p:cNvPr id="1" name=""/>
+        <p:cNvGrpSpPr/>
+        <p:nvPr/>
+      </p:nvGrpSpPr>
+      <p:grpSpPr>
+        <a:xfrm>
+          <a:off x="0" y="0"/>
+          <a:ext cx="0" cy="0"/>
+          <a:chOff x="0" y="0"/>
+          <a:chExt cx="0" cy="0"/>
+        </a:xfrm>
+      </p:grpSpPr>
+      <p:pic>
+        <p:nvPicPr>
+          <p:cNvPr id="3" name="Grafik 2">
+            <a:extLst>
+              <a:ext uri="{FF2B5EF4-FFF2-40B4-BE49-F238E27FC236}">
+                <a16:creationId xmlns:a16="http://schemas.microsoft.com/office/drawing/2014/main" id="{9FEBE283-BA4D-485F-918B-DC9ECDD5636A}"/>
+              </a:ext>
+            </a:extLst>
+          </p:cNvPr>
+          <p:cNvPicPr>
+            <a:picLocks noChangeAspect="1"/>
+          </p:cNvPicPr>
+          <p:nvPr/>
+        </p:nvPicPr>
+        <p:blipFill>
+          <a:blip r:embed="rId2"/>
+          <a:stretch>
+            <a:fillRect/>
+          </a:stretch>
+        </p:blipFill>
+        <p:spPr>
+          <a:xfrm>
+            <a:off x="5662800" y="3756182"/>
+            <a:ext cx="3253375" cy="1826211"/>
+          </a:xfrm>
+          <a:prstGeom prst="rect">
+            <a:avLst/>
+          </a:prstGeom>
+        </p:spPr>
+      </p:pic>
+      <p:pic>
+        <p:nvPicPr>
+          <p:cNvPr id="5" name="Grafik 4">
+            <a:extLst>
+              <a:ext uri="{FF2B5EF4-FFF2-40B4-BE49-F238E27FC236}">
+                <a16:creationId xmlns:a16="http://schemas.microsoft.com/office/drawing/2014/main" id="{7B5DE41E-E78F-486B-B3F9-724DEE0CDAB6}"/>
+              </a:ext>
+            </a:extLst>
+          </p:cNvPr>
+          <p:cNvPicPr>
+            <a:picLocks noChangeAspect="1"/>
+          </p:cNvPicPr>
+          <p:nvPr/>
+        </p:nvPicPr>
+        <p:blipFill rotWithShape="1">
+          <a:blip r:embed="rId3"/>
+          <a:srcRect b="16685"/>
+          <a:stretch/>
+        </p:blipFill>
+        <p:spPr>
+          <a:xfrm>
+            <a:off x="690229" y="824684"/>
+            <a:ext cx="3379835" cy="1830025"/>
+          </a:xfrm>
+          <a:prstGeom prst="rect">
+            <a:avLst/>
+          </a:prstGeom>
+        </p:spPr>
+      </p:pic>
+      <p:pic>
+        <p:nvPicPr>
+          <p:cNvPr id="7" name="Grafik 6" descr="Ein Bild, das Tisch enthält.&#10;&#10;Automatisch generierte Beschreibung">
+            <a:extLst>
+              <a:ext uri="{FF2B5EF4-FFF2-40B4-BE49-F238E27FC236}">
+                <a16:creationId xmlns:a16="http://schemas.microsoft.com/office/drawing/2014/main" id="{95828A7A-C4A2-4208-ADFE-8813A16FE325}"/>
+              </a:ext>
+            </a:extLst>
+          </p:cNvPr>
+          <p:cNvPicPr>
+            <a:picLocks noChangeAspect="1"/>
+          </p:cNvPicPr>
+          <p:nvPr/>
+        </p:nvPicPr>
+        <p:blipFill>
+          <a:blip r:embed="rId4"/>
+          <a:stretch>
+            <a:fillRect/>
+          </a:stretch>
+        </p:blipFill>
+        <p:spPr>
+          <a:xfrm>
+            <a:off x="5662800" y="824684"/>
+            <a:ext cx="3253375" cy="1830024"/>
+          </a:xfrm>
+          <a:prstGeom prst="rect">
+            <a:avLst/>
+          </a:prstGeom>
+        </p:spPr>
+      </p:pic>
+      <p:sp>
+        <p:nvSpPr>
+          <p:cNvPr id="8" name="Textfeld 7">
+            <a:extLst>
+              <a:ext uri="{FF2B5EF4-FFF2-40B4-BE49-F238E27FC236}">
+                <a16:creationId xmlns:a16="http://schemas.microsoft.com/office/drawing/2014/main" id="{869CD9A7-D01F-4F65-9B8D-80C9B40398F8}"/>
+              </a:ext>
+            </a:extLst>
+          </p:cNvPr>
+          <p:cNvSpPr txBox="1"/>
+          <p:nvPr/>
+        </p:nvSpPr>
+        <p:spPr>
+          <a:xfrm>
+            <a:off x="1046746" y="1739696"/>
+            <a:ext cx="2592805" cy="369332"/>
+          </a:xfrm>
+          <a:prstGeom prst="rect">
+            <a:avLst/>
+          </a:prstGeom>
+          <a:solidFill>
+            <a:schemeClr val="bg1"/>
+          </a:solidFill>
+          <a:ln w="6350">
+            <a:solidFill>
+              <a:schemeClr val="tx1"/>
+            </a:solidFill>
+          </a:ln>
+        </p:spPr>
+        <p:txBody>
+          <a:bodyPr wrap="square" rtlCol="0">
+            <a:spAutoFit/>
+          </a:bodyPr>
+          <a:lstStyle/>
+          <a:p>
+            <a:pPr algn="ctr"/>
+            <a:r>
+              <a:rPr lang="de-DE" dirty="0">
+                <a:solidFill>
+                  <a:srgbClr val="FF0000"/>
+                </a:solidFill>
+              </a:rPr>
+              <a:t>Raw-Data </a:t>
+            </a:r>
+            <a:r>
+              <a:rPr lang="de-DE" dirty="0" err="1">
+                <a:solidFill>
+                  <a:srgbClr val="FF0000"/>
+                </a:solidFill>
+              </a:rPr>
+              <a:t>index</a:t>
+            </a:r>
+            <a:endParaRPr lang="en-US" dirty="0">
+              <a:solidFill>
+                <a:srgbClr val="FF0000"/>
+              </a:solidFill>
+            </a:endParaRPr>
+          </a:p>
+        </p:txBody>
+      </p:sp>
+      <p:pic>
+        <p:nvPicPr>
+          <p:cNvPr id="10" name="Grafik 9">
+            <a:extLst>
+              <a:ext uri="{FF2B5EF4-FFF2-40B4-BE49-F238E27FC236}">
+                <a16:creationId xmlns:a16="http://schemas.microsoft.com/office/drawing/2014/main" id="{B6B84594-B68E-4A0F-A84A-0CC57699B405}"/>
+              </a:ext>
+            </a:extLst>
+          </p:cNvPr>
+          <p:cNvPicPr>
+            <a:picLocks noChangeAspect="1"/>
+          </p:cNvPicPr>
+          <p:nvPr/>
+        </p:nvPicPr>
+        <p:blipFill rotWithShape="1">
+          <a:blip r:embed="rId5"/>
+          <a:srcRect l="32122"/>
+          <a:stretch/>
+        </p:blipFill>
+        <p:spPr>
+          <a:xfrm>
+            <a:off x="690229" y="3805403"/>
+            <a:ext cx="3374001" cy="1888959"/>
+          </a:xfrm>
+          <a:prstGeom prst="rect">
+            <a:avLst/>
+          </a:prstGeom>
+        </p:spPr>
+      </p:pic>
+      <p:sp>
+        <p:nvSpPr>
+          <p:cNvPr id="11" name="Textfeld 10">
+            <a:extLst>
+              <a:ext uri="{FF2B5EF4-FFF2-40B4-BE49-F238E27FC236}">
+                <a16:creationId xmlns:a16="http://schemas.microsoft.com/office/drawing/2014/main" id="{E5642AA8-95FD-41A0-B845-405FC14AFC62}"/>
+              </a:ext>
+            </a:extLst>
+          </p:cNvPr>
+          <p:cNvSpPr txBox="1"/>
+          <p:nvPr/>
+        </p:nvSpPr>
+        <p:spPr>
+          <a:xfrm>
+            <a:off x="1080826" y="4669288"/>
+            <a:ext cx="2592805" cy="369332"/>
+          </a:xfrm>
+          <a:prstGeom prst="rect">
+            <a:avLst/>
+          </a:prstGeom>
+          <a:solidFill>
+            <a:schemeClr val="bg1"/>
+          </a:solidFill>
+          <a:ln w="6350">
+            <a:solidFill>
+              <a:schemeClr val="tx1"/>
+            </a:solidFill>
+          </a:ln>
+        </p:spPr>
+        <p:txBody>
+          <a:bodyPr wrap="square" rtlCol="0">
+            <a:spAutoFit/>
+          </a:bodyPr>
+          <a:lstStyle/>
+          <a:p>
+            <a:pPr algn="ctr"/>
+            <a:r>
+              <a:rPr lang="de-DE" dirty="0" err="1">
+                <a:solidFill>
+                  <a:srgbClr val="FF0000"/>
+                </a:solidFill>
+              </a:rPr>
+              <a:t>Hourly</a:t>
+            </a:r>
+            <a:r>
+              <a:rPr lang="de-DE" dirty="0">
+                <a:solidFill>
+                  <a:srgbClr val="FF0000"/>
+                </a:solidFill>
+              </a:rPr>
+              <a:t>-Data </a:t>
+            </a:r>
+            <a:r>
+              <a:rPr lang="de-DE" dirty="0" err="1">
+                <a:solidFill>
+                  <a:srgbClr val="FF0000"/>
+                </a:solidFill>
+              </a:rPr>
+              <a:t>index</a:t>
+            </a:r>
+            <a:endParaRPr lang="en-US" dirty="0">
+              <a:solidFill>
+                <a:srgbClr val="FF0000"/>
+              </a:solidFill>
+            </a:endParaRPr>
+          </a:p>
+        </p:txBody>
+      </p:sp>
+      <p:sp>
+        <p:nvSpPr>
+          <p:cNvPr id="13" name="Textfeld 12">
+            <a:extLst>
+              <a:ext uri="{FF2B5EF4-FFF2-40B4-BE49-F238E27FC236}">
+                <a16:creationId xmlns:a16="http://schemas.microsoft.com/office/drawing/2014/main" id="{D83A506C-829A-47E2-8858-A3605F79AAF2}"/>
+              </a:ext>
+            </a:extLst>
+          </p:cNvPr>
+          <p:cNvSpPr txBox="1"/>
+          <p:nvPr/>
+        </p:nvSpPr>
+        <p:spPr>
+          <a:xfrm>
+            <a:off x="6006871" y="4530787"/>
+            <a:ext cx="2592805" cy="646331"/>
+          </a:xfrm>
+          <a:prstGeom prst="rect">
+            <a:avLst/>
+          </a:prstGeom>
+          <a:solidFill>
+            <a:schemeClr val="bg1"/>
+          </a:solidFill>
+          <a:ln w="6350">
+            <a:solidFill>
+              <a:schemeClr val="tx1"/>
+            </a:solidFill>
+          </a:ln>
+        </p:spPr>
+        <p:txBody>
+          <a:bodyPr wrap="square" rtlCol="0">
+            <a:spAutoFit/>
+          </a:bodyPr>
+          <a:lstStyle/>
+          <a:p>
+            <a:pPr algn="ctr"/>
+            <a:r>
+              <a:rPr lang="de-DE" dirty="0">
+                <a:solidFill>
+                  <a:srgbClr val="FF0000"/>
+                </a:solidFill>
+              </a:rPr>
+              <a:t>Quarterly- </a:t>
+            </a:r>
+            <a:r>
+              <a:rPr lang="de-DE" dirty="0" err="1">
+                <a:solidFill>
+                  <a:srgbClr val="FF0000"/>
+                </a:solidFill>
+              </a:rPr>
+              <a:t>or</a:t>
+            </a:r>
+            <a:r>
+              <a:rPr lang="de-DE" dirty="0">
+                <a:solidFill>
+                  <a:srgbClr val="FF0000"/>
+                </a:solidFill>
+              </a:rPr>
+              <a:t> </a:t>
+            </a:r>
+            <a:r>
+              <a:rPr lang="de-DE" dirty="0" err="1">
+                <a:solidFill>
+                  <a:srgbClr val="FF0000"/>
+                </a:solidFill>
+              </a:rPr>
+              <a:t>Yearly</a:t>
+            </a:r>
+            <a:r>
+              <a:rPr lang="de-DE" dirty="0">
+                <a:solidFill>
+                  <a:srgbClr val="FF0000"/>
+                </a:solidFill>
+              </a:rPr>
+              <a:t>-Dashboard</a:t>
+            </a:r>
+            <a:endParaRPr lang="en-US" dirty="0">
+              <a:solidFill>
+                <a:srgbClr val="FF0000"/>
+              </a:solidFill>
+            </a:endParaRPr>
+          </a:p>
+        </p:txBody>
+      </p:sp>
+      <p:sp>
+        <p:nvSpPr>
+          <p:cNvPr id="14" name="Textfeld 13">
+            <a:extLst>
+              <a:ext uri="{FF2B5EF4-FFF2-40B4-BE49-F238E27FC236}">
+                <a16:creationId xmlns:a16="http://schemas.microsoft.com/office/drawing/2014/main" id="{21B0A6D5-4422-4DB3-A0E8-DE32B57806C1}"/>
+              </a:ext>
+            </a:extLst>
+          </p:cNvPr>
+          <p:cNvSpPr txBox="1"/>
+          <p:nvPr/>
+        </p:nvSpPr>
+        <p:spPr>
+          <a:xfrm>
+            <a:off x="6006871" y="1617870"/>
+            <a:ext cx="2592805" cy="369332"/>
+          </a:xfrm>
+          <a:prstGeom prst="rect">
+            <a:avLst/>
+          </a:prstGeom>
+          <a:solidFill>
+            <a:schemeClr val="bg1"/>
+          </a:solidFill>
+          <a:ln w="6350">
+            <a:solidFill>
+              <a:schemeClr val="tx1"/>
+            </a:solidFill>
+          </a:ln>
+        </p:spPr>
+        <p:txBody>
+          <a:bodyPr wrap="square" rtlCol="0">
+            <a:spAutoFit/>
+          </a:bodyPr>
+          <a:lstStyle/>
+          <a:p>
+            <a:pPr algn="ctr"/>
+            <a:r>
+              <a:rPr lang="de-DE" dirty="0">
+                <a:solidFill>
+                  <a:srgbClr val="FF0000"/>
+                </a:solidFill>
+              </a:rPr>
+              <a:t>Real-Time Dashboard</a:t>
+            </a:r>
+            <a:endParaRPr lang="en-US" dirty="0">
+              <a:solidFill>
+                <a:srgbClr val="FF0000"/>
+              </a:solidFill>
+            </a:endParaRPr>
+          </a:p>
+        </p:txBody>
+      </p:sp>
+      <p:sp>
+        <p:nvSpPr>
+          <p:cNvPr id="15" name="Pfeil: nach unten 14">
+            <a:extLst>
+              <a:ext uri="{FF2B5EF4-FFF2-40B4-BE49-F238E27FC236}">
+                <a16:creationId xmlns:a16="http://schemas.microsoft.com/office/drawing/2014/main" id="{3DB22C3F-ECE2-432E-8FCE-0E6C9F44E856}"/>
+              </a:ext>
+            </a:extLst>
+          </p:cNvPr>
+          <p:cNvSpPr/>
+          <p:nvPr/>
+        </p:nvSpPr>
+        <p:spPr>
+          <a:xfrm>
+            <a:off x="1477440" y="2814443"/>
+            <a:ext cx="511342" cy="879702"/>
+          </a:xfrm>
+          <a:prstGeom prst="downArrow">
+            <a:avLst/>
+          </a:prstGeom>
+        </p:spPr>
+        <p:style>
+          <a:lnRef idx="2">
+            <a:schemeClr val="dk1"/>
+          </a:lnRef>
+          <a:fillRef idx="1">
+            <a:schemeClr val="lt1"/>
+          </a:fillRef>
+          <a:effectRef idx="0">
+            <a:schemeClr val="dk1"/>
+          </a:effectRef>
+          <a:fontRef idx="minor">
+            <a:schemeClr val="dk1"/>
+          </a:fontRef>
+        </p:style>
+        <p:txBody>
+          <a:bodyPr rtlCol="0" anchor="ctr"/>
+          <a:lstStyle/>
+          <a:p>
+            <a:pPr algn="ctr"/>
+            <a:endParaRPr lang="en-US"/>
+          </a:p>
+        </p:txBody>
+      </p:sp>
+      <p:sp>
+        <p:nvSpPr>
+          <p:cNvPr id="16" name="Textfeld 15">
+            <a:extLst>
+              <a:ext uri="{FF2B5EF4-FFF2-40B4-BE49-F238E27FC236}">
+                <a16:creationId xmlns:a16="http://schemas.microsoft.com/office/drawing/2014/main" id="{BB234F0D-0D83-471D-8BB2-C62D346423CC}"/>
+              </a:ext>
+            </a:extLst>
+          </p:cNvPr>
+          <p:cNvSpPr txBox="1"/>
+          <p:nvPr/>
+        </p:nvSpPr>
+        <p:spPr>
+          <a:xfrm>
+            <a:off x="2054957" y="2936556"/>
+            <a:ext cx="2124001" cy="646331"/>
+          </a:xfrm>
+          <a:prstGeom prst="rect">
+            <a:avLst/>
+          </a:prstGeom>
+          <a:noFill/>
+        </p:spPr>
+        <p:txBody>
+          <a:bodyPr wrap="square" rtlCol="0">
+            <a:spAutoFit/>
+          </a:bodyPr>
+          <a:lstStyle/>
+          <a:p>
+            <a:r>
+              <a:rPr lang="de-DE" sz="1200" b="1" dirty="0"/>
+              <a:t>Transformation</a:t>
+            </a:r>
+            <a:r>
+              <a:rPr lang="de-DE" sz="1200" dirty="0"/>
+              <a:t> </a:t>
+            </a:r>
+            <a:br>
+              <a:rPr lang="de-DE" sz="1200" dirty="0"/>
+            </a:br>
+            <a:r>
+              <a:rPr lang="de-DE" sz="1200" dirty="0" err="1"/>
+              <a:t>Hourly</a:t>
+            </a:r>
+            <a:r>
+              <a:rPr lang="de-DE" sz="1200" dirty="0"/>
+              <a:t> </a:t>
+            </a:r>
+            <a:r>
+              <a:rPr lang="de-DE" sz="1200" dirty="0" err="1"/>
+              <a:t>buckets</a:t>
+            </a:r>
+            <a:r>
+              <a:rPr lang="de-DE" sz="1200" dirty="0"/>
+              <a:t> </a:t>
+            </a:r>
+            <a:br>
+              <a:rPr lang="de-DE" sz="1200" dirty="0"/>
+            </a:br>
+            <a:r>
+              <a:rPr lang="de-DE" sz="1200" dirty="0"/>
+              <a:t>Delay </a:t>
+            </a:r>
+            <a:r>
+              <a:rPr lang="de-DE" sz="1200" dirty="0" err="1"/>
+              <a:t>of</a:t>
+            </a:r>
+            <a:r>
+              <a:rPr lang="de-DE" sz="1200" dirty="0"/>
+              <a:t> 3 </a:t>
+            </a:r>
+            <a:r>
+              <a:rPr lang="de-DE" sz="1200" dirty="0" err="1"/>
+              <a:t>hours</a:t>
+            </a:r>
+            <a:r>
+              <a:rPr lang="de-DE" sz="1200" dirty="0"/>
+              <a:t>.</a:t>
+            </a:r>
+            <a:endParaRPr lang="en-US" sz="1200" dirty="0"/>
+          </a:p>
+        </p:txBody>
+      </p:sp>
+      <p:sp>
+        <p:nvSpPr>
+          <p:cNvPr id="17" name="Pfeil: nach unten 16">
+            <a:extLst>
+              <a:ext uri="{FF2B5EF4-FFF2-40B4-BE49-F238E27FC236}">
+                <a16:creationId xmlns:a16="http://schemas.microsoft.com/office/drawing/2014/main" id="{34A45468-B1B8-49C6-8B87-3A12D46CEE38}"/>
+              </a:ext>
+            </a:extLst>
+          </p:cNvPr>
+          <p:cNvSpPr/>
+          <p:nvPr/>
+        </p:nvSpPr>
+        <p:spPr>
+          <a:xfrm rot="16200000">
+            <a:off x="4610761" y="1362685"/>
+            <a:ext cx="511342" cy="879702"/>
+          </a:xfrm>
+          <a:prstGeom prst="downArrow">
+            <a:avLst/>
+          </a:prstGeom>
+        </p:spPr>
+        <p:style>
+          <a:lnRef idx="2">
+            <a:schemeClr val="dk1"/>
+          </a:lnRef>
+          <a:fillRef idx="1">
+            <a:schemeClr val="lt1"/>
+          </a:fillRef>
+          <a:effectRef idx="0">
+            <a:schemeClr val="dk1"/>
+          </a:effectRef>
+          <a:fontRef idx="minor">
+            <a:schemeClr val="dk1"/>
+          </a:fontRef>
+        </p:style>
+        <p:txBody>
+          <a:bodyPr rtlCol="0" anchor="ctr"/>
+          <a:lstStyle/>
+          <a:p>
+            <a:pPr algn="ctr"/>
+            <a:endParaRPr lang="en-US"/>
+          </a:p>
+        </p:txBody>
+      </p:sp>
+      <p:sp>
+        <p:nvSpPr>
+          <p:cNvPr id="18" name="Pfeil: nach unten 17">
+            <a:extLst>
+              <a:ext uri="{FF2B5EF4-FFF2-40B4-BE49-F238E27FC236}">
+                <a16:creationId xmlns:a16="http://schemas.microsoft.com/office/drawing/2014/main" id="{389171DB-69B3-4709-9FD3-8E52B62589EA}"/>
+              </a:ext>
+            </a:extLst>
+          </p:cNvPr>
+          <p:cNvSpPr/>
+          <p:nvPr/>
+        </p:nvSpPr>
+        <p:spPr>
+          <a:xfrm rot="16200000">
+            <a:off x="4610761" y="4414103"/>
+            <a:ext cx="511342" cy="879702"/>
+          </a:xfrm>
+          <a:prstGeom prst="downArrow">
+            <a:avLst/>
+          </a:prstGeom>
+        </p:spPr>
+        <p:style>
+          <a:lnRef idx="2">
+            <a:schemeClr val="dk1"/>
+          </a:lnRef>
+          <a:fillRef idx="1">
+            <a:schemeClr val="lt1"/>
+          </a:fillRef>
+          <a:effectRef idx="0">
+            <a:schemeClr val="dk1"/>
+          </a:effectRef>
+          <a:fontRef idx="minor">
+            <a:schemeClr val="dk1"/>
+          </a:fontRef>
+        </p:style>
+        <p:txBody>
+          <a:bodyPr rtlCol="0" anchor="ctr"/>
+          <a:lstStyle/>
+          <a:p>
+            <a:pPr algn="ctr"/>
+            <a:endParaRPr lang="en-US"/>
+          </a:p>
+        </p:txBody>
+      </p:sp>
+    </p:spTree>
+    <p:extLst>
+      <p:ext uri="{BB962C8B-B14F-4D97-AF65-F5344CB8AC3E}">
+        <p14:creationId xmlns:p14="http://schemas.microsoft.com/office/powerpoint/2010/main" val="3680680623"/>
+      </p:ext>
+    </p:extLst>
+  </p:cSld>
+  <p:clrMapOvr>
+    <a:masterClrMapping/>
+  </p:clrMapOvr>
+</p:sld>
+</file>
+
 <file path=ppt/theme/theme1.xml><?xml version="1.0" encoding="utf-8"?>
 <a:theme xmlns:a="http://schemas.openxmlformats.org/drawingml/2006/main" name="Office">
   <a:themeElements>

</xml_diff>